<commit_message>
add slide on tweeter API
</commit_message>
<xml_diff>
--- a/docs/Yata.pptx
+++ b/docs/Yata.pptx
@@ -15,6 +15,9 @@
     <p:sldId id="260" r:id="rId12"/>
     <p:sldId id="261" r:id="rId13"/>
     <p:sldId id="262" r:id="rId14"/>
+    <p:sldId id="263" r:id="rId15"/>
+    <p:sldId id="264" r:id="rId16"/>
+    <p:sldId id="265" r:id="rId17"/>
   </p:sldIdLst>
   <p:sldSz cx="9144000" cy="5143500"/>
   <p:notesSz cx="6858000" cy="9144000"/>
@@ -3393,6 +3396,344 @@
 </p:sld>
 </file>
 
+<file path=ppt/slides/slide10.xml><?xml version="1.0" encoding="utf-8"?>
+<p:sld xmlns:a="http://schemas.openxmlformats.org/drawingml/2006/main" xmlns:r="http://schemas.openxmlformats.org/officeDocument/2006/relationships" xmlns:p="http://schemas.openxmlformats.org/presentationml/2006/main" showMasterSp="1" showMasterPhAnim="1">
+  <p:cSld>
+    <p:spTree>
+      <p:nvGrpSpPr>
+        <p:cNvPr id="1" name=""/>
+        <p:cNvGrpSpPr/>
+        <p:nvPr/>
+      </p:nvGrpSpPr>
+      <p:grpSpPr>
+        <a:xfrm>
+          <a:off x="0" y="0"/>
+          <a:ext cx="0" cy="0"/>
+          <a:chOff x="0" y="0"/>
+          <a:chExt cx="0" cy="0"/>
+        </a:xfrm>
+      </p:grpSpPr>
+      <p:sp>
+        <p:nvSpPr>
+          <p:cNvPr id="86" name="Shape 86"/>
+          <p:cNvSpPr/>
+          <p:nvPr>
+            <p:ph type="title"/>
+          </p:nvPr>
+        </p:nvSpPr>
+        <p:spPr>
+          <a:xfrm>
+            <a:off x="317421" y="109206"/>
+            <a:ext cx="1479900" cy="225960"/>
+          </a:xfrm>
+          <a:prstGeom prst="rect">
+            <a:avLst/>
+          </a:prstGeom>
+        </p:spPr>
+        <p:txBody>
+          <a:bodyPr>
+            <a:normAutofit fontScale="100000" lnSpcReduction="0"/>
+          </a:bodyPr>
+          <a:lstStyle>
+            <a:lvl1pPr defTabSz="425195">
+              <a:defRPr sz="1488"/>
+            </a:lvl1pPr>
+          </a:lstStyle>
+          <a:p>
+            <a:pPr lvl="0">
+              <a:defRPr sz="1800">
+                <a:solidFill>
+                  <a:srgbClr val="000000"/>
+                </a:solidFill>
+              </a:defRPr>
+            </a:pPr>
+            <a:r>
+              <a:rPr sz="1488">
+                <a:solidFill>
+                  <a:srgbClr val="FFFFFF"/>
+                </a:solidFill>
+              </a:rPr>
+              <a:t>Développement</a:t>
+            </a:r>
+          </a:p>
+        </p:txBody>
+      </p:sp>
+      <p:sp>
+        <p:nvSpPr>
+          <p:cNvPr id="87" name="Shape 87"/>
+          <p:cNvSpPr/>
+          <p:nvPr>
+            <p:ph type="body" idx="1"/>
+          </p:nvPr>
+        </p:nvSpPr>
+        <p:spPr>
+          <a:xfrm>
+            <a:off x="317421" y="358311"/>
+            <a:ext cx="3557405" cy="272821"/>
+          </a:xfrm>
+          <a:prstGeom prst="rect">
+            <a:avLst/>
+          </a:prstGeom>
+        </p:spPr>
+        <p:txBody>
+          <a:bodyPr>
+            <a:normAutofit fontScale="100000" lnSpcReduction="0"/>
+          </a:bodyPr>
+          <a:lstStyle>
+            <a:lvl1pPr marL="0" indent="0">
+              <a:spcBef>
+                <a:spcPts val="300"/>
+              </a:spcBef>
+              <a:buSzTx/>
+              <a:buNone/>
+              <a:defRPr sz="1500">
+                <a:solidFill>
+                  <a:srgbClr val="FFFFFF"/>
+                </a:solidFill>
+              </a:defRPr>
+            </a:lvl1pPr>
+          </a:lstStyle>
+          <a:p>
+            <a:pPr lvl="0">
+              <a:defRPr b="0" sz="1800">
+                <a:solidFill>
+                  <a:srgbClr val="000000"/>
+                </a:solidFill>
+              </a:defRPr>
+            </a:pPr>
+            <a:r>
+              <a:rPr b="1" sz="1500">
+                <a:solidFill>
+                  <a:srgbClr val="FFFFFF"/>
+                </a:solidFill>
+              </a:rPr>
+              <a:t>API Twitter</a:t>
+            </a:r>
+          </a:p>
+        </p:txBody>
+      </p:sp>
+      <p:pic>
+        <p:nvPicPr>
+          <p:cNvPr id="88" name="twitter-search-alltwitter.png"/>
+          <p:cNvPicPr/>
+          <p:nvPr/>
+        </p:nvPicPr>
+        <p:blipFill>
+          <a:blip r:embed="rId2">
+            <a:extLst/>
+          </a:blip>
+          <a:stretch>
+            <a:fillRect/>
+          </a:stretch>
+        </p:blipFill>
+        <p:spPr>
+          <a:xfrm>
+            <a:off x="190500" y="1181099"/>
+            <a:ext cx="1358991" cy="894670"/>
+          </a:xfrm>
+          <a:prstGeom prst="rect">
+            <a:avLst/>
+          </a:prstGeom>
+          <a:ln w="12700">
+            <a:miter lim="400000"/>
+          </a:ln>
+        </p:spPr>
+      </p:pic>
+      <p:sp>
+        <p:nvSpPr>
+          <p:cNvPr id="89" name="Shape 89"/>
+          <p:cNvSpPr/>
+          <p:nvPr/>
+        </p:nvSpPr>
+        <p:spPr>
+          <a:xfrm>
+            <a:off x="672350" y="2536836"/>
+            <a:ext cx="7925919" cy="2225041"/>
+          </a:xfrm>
+          <a:prstGeom prst="rect">
+            <a:avLst/>
+          </a:prstGeom>
+          <a:ln w="12700">
+            <a:miter lim="400000"/>
+          </a:ln>
+          <a:extLst>
+            <a:ext uri="{C572A759-6A51-4108-AA02-DFA0A04FC94B}">
+              <ma14:wrappingTextBoxFlag xmlns:ma14="http://schemas.microsoft.com/office/mac/drawingml/2011/main" val="1"/>
+            </a:ext>
+          </a:extLst>
+        </p:spPr>
+        <p:txBody>
+          <a:bodyPr lIns="45719" rIns="45719">
+            <a:spAutoFit/>
+          </a:bodyPr>
+          <a:lstStyle/>
+          <a:p>
+            <a:pPr lvl="0"/>
+            <a:r>
+              <a:rPr b="1"/>
+              <a:t>User timeline:</a:t>
+            </a:r>
+            <a:r>
+              <a:t> </a:t>
+            </a:r>
+            <a:r>
+              <a:rPr u="sng">
+                <a:solidFill>
+                  <a:srgbClr val="0000FF"/>
+                </a:solidFill>
+                <a:uFill>
+                  <a:solidFill>
+                    <a:srgbClr val="0000FF"/>
+                  </a:solidFill>
+                </a:uFill>
+                <a:hlinkClick r:id="rId3" invalidUrl="" action="" tgtFrame="" tooltip="" history="1" highlightClick="0" endSnd="0"/>
+              </a:rPr>
+              <a:t>https://api.twitter.com/1.1/statuses/user_timeline.json</a:t>
+            </a:r>
+          </a:p>
+          <a:p>
+            <a:pPr lvl="0"/>
+            <a:r>
+              <a:t>Tweets d’un utilisateur précis.</a:t>
+            </a:r>
+          </a:p>
+          <a:p>
+            <a:pPr lvl="0"/>
+            <a:r>
+              <a:rPr b="1"/>
+              <a:t>Mentions:</a:t>
+            </a:r>
+            <a:r>
+              <a:t> </a:t>
+            </a:r>
+            <a:r>
+              <a:rPr u="sng">
+                <a:solidFill>
+                  <a:srgbClr val="0000FF"/>
+                </a:solidFill>
+                <a:uFill>
+                  <a:solidFill>
+                    <a:srgbClr val="0000FF"/>
+                  </a:solidFill>
+                </a:uFill>
+                <a:hlinkClick r:id="rId3" invalidUrl="" action="" tgtFrame="" tooltip="" history="1" highlightClick="0" endSnd="0"/>
+              </a:rPr>
+              <a:t>https://api.twitter.com/1.1/statuses/mentions_timeline.json</a:t>
+            </a:r>
+          </a:p>
+          <a:p>
+            <a:pPr lvl="0"/>
+            <a:r>
+              <a:t>Tweets mentionnant un utilisateur précis.</a:t>
+            </a:r>
+          </a:p>
+          <a:p>
+            <a:pPr lvl="0"/>
+            <a:r>
+              <a:rPr b="1"/>
+              <a:t>Home timeline:</a:t>
+            </a:r>
+            <a:r>
+              <a:t> </a:t>
+            </a:r>
+            <a:r>
+              <a:rPr u="sng">
+                <a:solidFill>
+                  <a:srgbClr val="0000FF"/>
+                </a:solidFill>
+                <a:uFill>
+                  <a:solidFill>
+                    <a:srgbClr val="0000FF"/>
+                  </a:solidFill>
+                </a:uFill>
+                <a:hlinkClick r:id="rId3" invalidUrl="" action="" tgtFrame="" tooltip="" history="1" highlightClick="0" endSnd="0"/>
+              </a:rPr>
+              <a:t>https://api.twitter.com/1.1/statuses/home_timeline.json</a:t>
+            </a:r>
+          </a:p>
+          <a:p>
+            <a:pPr lvl="0"/>
+            <a:r>
+              <a:t>Tweets provenant des utilisateurs suivis.</a:t>
+            </a:r>
+          </a:p>
+          <a:p>
+            <a:pPr lvl="0"/>
+            <a:r>
+              <a:rPr b="1"/>
+              <a:t>Twitter search:</a:t>
+            </a:r>
+            <a:r>
+              <a:t> </a:t>
+            </a:r>
+            <a:r>
+              <a:rPr u="sng">
+                <a:solidFill>
+                  <a:srgbClr val="0000FF"/>
+                </a:solidFill>
+                <a:uFill>
+                  <a:solidFill>
+                    <a:srgbClr val="0000FF"/>
+                  </a:solidFill>
+                </a:uFill>
+                <a:hlinkClick r:id="rId3" invalidUrl="" action="" tgtFrame="" tooltip="" history="1" highlightClick="0" endSnd="0"/>
+              </a:rPr>
+              <a:t>https://api.twitter.com/1.1/search/tweets.json</a:t>
+            </a:r>
+          </a:p>
+          <a:p>
+            <a:pPr lvl="0"/>
+            <a:r>
+              <a:t>Tweets provenant d’une recherche précises (mot-clés, hashtags, etc)</a:t>
+            </a:r>
+          </a:p>
+        </p:txBody>
+      </p:sp>
+      <p:sp>
+        <p:nvSpPr>
+          <p:cNvPr id="90" name="Shape 90"/>
+          <p:cNvSpPr/>
+          <p:nvPr/>
+        </p:nvSpPr>
+        <p:spPr>
+          <a:xfrm>
+            <a:off x="2005342" y="1316014"/>
+            <a:ext cx="5768688" cy="624841"/>
+          </a:xfrm>
+          <a:prstGeom prst="rect">
+            <a:avLst/>
+          </a:prstGeom>
+          <a:ln w="12700">
+            <a:miter lim="400000"/>
+          </a:ln>
+          <a:extLst>
+            <a:ext uri="{C572A759-6A51-4108-AA02-DFA0A04FC94B}">
+              <ma14:wrappingTextBoxFlag xmlns:ma14="http://schemas.microsoft.com/office/mac/drawingml/2011/main" val="1"/>
+            </a:ext>
+          </a:extLst>
+        </p:spPr>
+        <p:txBody>
+          <a:bodyPr wrap="none" lIns="45719" rIns="45719">
+            <a:spAutoFit/>
+          </a:bodyPr>
+          <a:lstStyle/>
+          <a:p>
+            <a:pPr lvl="0"/>
+            <a:r>
+              <a:t>L’API Twitter nous propose différentes fonctionnalités.</a:t>
+            </a:r>
+          </a:p>
+        </p:txBody>
+      </p:sp>
+    </p:spTree>
+  </p:cSld>
+  <p:clrMapOvr>
+    <a:masterClrMapping/>
+  </p:clrMapOvr>
+  <p:transition spd="med" advClick="1"/>
+</p:sld>
+</file>
+
 <file path=ppt/slides/slide2.xml><?xml version="1.0" encoding="utf-8"?>
 <p:sld xmlns:a="http://schemas.openxmlformats.org/drawingml/2006/main" xmlns:r="http://schemas.openxmlformats.org/officeDocument/2006/relationships" xmlns:p="http://schemas.openxmlformats.org/presentationml/2006/main" showMasterSp="1" showMasterPhAnim="1">
   <p:cSld>
@@ -3413,209 +3754,6 @@
       <p:sp>
         <p:nvSpPr>
           <p:cNvPr id="48" name="Shape 48"/>
-          <p:cNvSpPr/>
-          <p:nvPr>
-            <p:ph type="body" idx="1"/>
-          </p:nvPr>
-        </p:nvSpPr>
-        <p:spPr>
-          <a:xfrm>
-            <a:off x="562517" y="1119615"/>
-            <a:ext cx="7887628" cy="3394472"/>
-          </a:xfrm>
-          <a:prstGeom prst="rect">
-            <a:avLst/>
-          </a:prstGeom>
-        </p:spPr>
-        <p:txBody>
-          <a:bodyPr lIns="0" tIns="0" rIns="0" bIns="0">
-            <a:normAutofit fontScale="100000" lnSpcReduction="0"/>
-          </a:bodyPr>
-          <a:lstStyle/>
-          <a:p>
-            <a:pPr lvl="0">
-              <a:buBlip>
-                <a:blip r:embed="rId2"/>
-              </a:buBlip>
-              <a:defRPr b="0" sz="1800">
-                <a:solidFill>
-                  <a:srgbClr val="000000"/>
-                </a:solidFill>
-              </a:defRPr>
-            </a:pPr>
-            <a:r>
-              <a:rPr b="1" sz="2600">
-                <a:solidFill>
-                  <a:srgbClr val="123A61"/>
-                </a:solidFill>
-              </a:rPr>
-              <a:t>Projet « YATA »</a:t>
-            </a:r>
-            <a:endParaRPr b="1" sz="2600">
-              <a:solidFill>
-                <a:srgbClr val="123A61"/>
-              </a:solidFill>
-            </a:endParaRPr>
-          </a:p>
-          <a:p>
-            <a:pPr lvl="0">
-              <a:buBlip>
-                <a:blip r:embed="rId2"/>
-              </a:buBlip>
-              <a:defRPr b="0" sz="1800">
-                <a:solidFill>
-                  <a:srgbClr val="000000"/>
-                </a:solidFill>
-              </a:defRPr>
-            </a:pPr>
-            <a:r>
-              <a:rPr b="1" sz="2600">
-                <a:solidFill>
-                  <a:srgbClr val="123A61"/>
-                </a:solidFill>
-              </a:rPr>
-              <a:t>Développement</a:t>
-            </a:r>
-            <a:endParaRPr b="1" sz="2600">
-              <a:solidFill>
-                <a:srgbClr val="123A61"/>
-              </a:solidFill>
-            </a:endParaRPr>
-          </a:p>
-          <a:p>
-            <a:pPr lvl="1" marL="742950" indent="-285750">
-              <a:spcBef>
-                <a:spcPts val="400"/>
-              </a:spcBef>
-              <a:buFont typeface="Arial"/>
-              <a:defRPr b="0" sz="1800">
-                <a:solidFill>
-                  <a:srgbClr val="000000"/>
-                </a:solidFill>
-              </a:defRPr>
-            </a:pPr>
-            <a:r>
-              <a:rPr sz="2000">
-                <a:latin typeface="Segoe UI Semilight"/>
-                <a:ea typeface="Segoe UI Semilight"/>
-                <a:cs typeface="Segoe UI Semilight"/>
-                <a:sym typeface="Segoe UI Semilight"/>
-              </a:rPr>
-              <a:t>FRONT</a:t>
-            </a:r>
-            <a:endParaRPr sz="2000">
-              <a:latin typeface="Segoe UI Semilight"/>
-              <a:ea typeface="Segoe UI Semilight"/>
-              <a:cs typeface="Segoe UI Semilight"/>
-              <a:sym typeface="Segoe UI Semilight"/>
-            </a:endParaRPr>
-          </a:p>
-          <a:p>
-            <a:pPr lvl="1" marL="742950" indent="-285750">
-              <a:spcBef>
-                <a:spcPts val="400"/>
-              </a:spcBef>
-              <a:buFont typeface="Arial"/>
-              <a:defRPr b="0" sz="1800">
-                <a:solidFill>
-                  <a:srgbClr val="000000"/>
-                </a:solidFill>
-              </a:defRPr>
-            </a:pPr>
-            <a:r>
-              <a:rPr sz="2000">
-                <a:latin typeface="Segoe UI Semilight"/>
-                <a:ea typeface="Segoe UI Semilight"/>
-                <a:cs typeface="Segoe UI Semilight"/>
-                <a:sym typeface="Segoe UI Semilight"/>
-              </a:rPr>
-              <a:t>BACK-END</a:t>
-            </a:r>
-            <a:endParaRPr sz="2000">
-              <a:latin typeface="Segoe UI Semilight"/>
-              <a:ea typeface="Segoe UI Semilight"/>
-              <a:cs typeface="Segoe UI Semilight"/>
-              <a:sym typeface="Segoe UI Semilight"/>
-            </a:endParaRPr>
-          </a:p>
-          <a:p>
-            <a:pPr lvl="1" marL="742950" indent="-285750">
-              <a:spcBef>
-                <a:spcPts val="400"/>
-              </a:spcBef>
-              <a:buFont typeface="Arial"/>
-              <a:defRPr b="0" sz="1800">
-                <a:solidFill>
-                  <a:srgbClr val="000000"/>
-                </a:solidFill>
-              </a:defRPr>
-            </a:pPr>
-            <a:r>
-              <a:rPr sz="2000">
-                <a:latin typeface="Segoe UI Semilight"/>
-                <a:ea typeface="Segoe UI Semilight"/>
-                <a:cs typeface="Segoe UI Semilight"/>
-                <a:sym typeface="Segoe UI Semilight"/>
-              </a:rPr>
-              <a:t>BDD</a:t>
-            </a:r>
-            <a:endParaRPr sz="2000">
-              <a:latin typeface="Segoe UI Semilight"/>
-              <a:ea typeface="Segoe UI Semilight"/>
-              <a:cs typeface="Segoe UI Semilight"/>
-              <a:sym typeface="Segoe UI Semilight"/>
-            </a:endParaRPr>
-          </a:p>
-          <a:p>
-            <a:pPr lvl="0">
-              <a:buBlip>
-                <a:blip r:embed="rId2"/>
-              </a:buBlip>
-              <a:defRPr b="0" sz="1800">
-                <a:solidFill>
-                  <a:srgbClr val="000000"/>
-                </a:solidFill>
-              </a:defRPr>
-            </a:pPr>
-            <a:r>
-              <a:rPr b="1" sz="2600">
-                <a:solidFill>
-                  <a:srgbClr val="123A61"/>
-                </a:solidFill>
-              </a:rPr>
-              <a:t>Bilan</a:t>
-            </a:r>
-            <a:endParaRPr b="1" sz="2600">
-              <a:solidFill>
-                <a:srgbClr val="123A61"/>
-              </a:solidFill>
-            </a:endParaRPr>
-          </a:p>
-          <a:p>
-            <a:pPr lvl="0">
-              <a:buBlip>
-                <a:blip r:embed="rId2"/>
-              </a:buBlip>
-              <a:defRPr b="0" sz="1800">
-                <a:solidFill>
-                  <a:srgbClr val="000000"/>
-                </a:solidFill>
-              </a:defRPr>
-            </a:pPr>
-            <a:r>
-              <a:rPr b="1" sz="2600">
-                <a:solidFill>
-                  <a:srgbClr val="123A61"/>
-                </a:solidFill>
-              </a:rPr>
-              <a:t>Conclusion</a:t>
-            </a:r>
-          </a:p>
-        </p:txBody>
-      </p:sp>
-      <p:sp>
-        <p:nvSpPr>
-          <p:cNvPr id="49" name="Shape 49"/>
           <p:cNvSpPr/>
           <p:nvPr/>
         </p:nvSpPr>
@@ -3671,6 +3809,96 @@
                 </a:solidFill>
               </a:rPr>
               <a:t>Sommaire</a:t>
+            </a:r>
+          </a:p>
+        </p:txBody>
+      </p:sp>
+      <p:sp>
+        <p:nvSpPr>
+          <p:cNvPr id="49" name="Shape 49"/>
+          <p:cNvSpPr/>
+          <p:nvPr/>
+        </p:nvSpPr>
+        <p:spPr>
+          <a:xfrm>
+            <a:off x="1262888" y="1389379"/>
+            <a:ext cx="6618224" cy="3291841"/>
+          </a:xfrm>
+          <a:prstGeom prst="rect">
+            <a:avLst/>
+          </a:prstGeom>
+          <a:ln w="12700">
+            <a:miter lim="400000"/>
+          </a:ln>
+          <a:extLst>
+            <a:ext uri="{C572A759-6A51-4108-AA02-DFA0A04FC94B}">
+              <ma14:wrappingTextBoxFlag xmlns:ma14="http://schemas.microsoft.com/office/mac/drawingml/2011/main" val="1"/>
+            </a:ext>
+          </a:extLst>
+        </p:spPr>
+        <p:txBody>
+          <a:bodyPr lIns="45719" rIns="45719">
+            <a:spAutoFit/>
+          </a:bodyPr>
+          <a:lstStyle/>
+          <a:p>
+            <a:pPr lvl="0"/>
+            <a:r>
+              <a:t>Todo :</a:t>
+            </a:r>
+          </a:p>
+          <a:p>
+            <a:pPr lvl="0"/>
+          </a:p>
+          <a:p>
+            <a:pPr lvl="0"/>
+            <a:r>
+              <a:t>jb presentation du projet</a:t>
+            </a:r>
+          </a:p>
+          <a:p>
+            <a:pPr lvl="0"/>
+            <a:r>
+              <a:t>Adrien Front</a:t>
+            </a:r>
+          </a:p>
+          <a:p>
+            <a:pPr lvl="0"/>
+            <a:r>
+              <a:t>Jb API twitter</a:t>
+            </a:r>
+          </a:p>
+          <a:p>
+            <a:pPr lvl="0"/>
+            <a:r>
+              <a:t>Steven Symfony</a:t>
+            </a:r>
+          </a:p>
+          <a:p>
+            <a:pPr lvl="0"/>
+            <a:r>
+              <a:t>Issam formulaire</a:t>
+            </a:r>
+          </a:p>
+          <a:p>
+            <a:pPr lvl="0"/>
+            <a:r>
+              <a:t>Samuel  Mongo DB</a:t>
+            </a:r>
+          </a:p>
+          <a:p>
+            <a:pPr lvl="0"/>
+          </a:p>
+          <a:p>
+            <a:pPr lvl="0"/>
+            <a:r>
+              <a:t>Conclusion : Bilan.</a:t>
+            </a:r>
+          </a:p>
+          <a:p>
+            <a:pPr lvl="0"/>
+            <a:r>
+              <a:t>Difficultés rencontrées.</a:t>
             </a:r>
           </a:p>
         </p:txBody>
@@ -3706,33 +3934,6 @@
           <p:cNvPr id="51" name="Shape 51"/>
           <p:cNvSpPr/>
           <p:nvPr>
-            <p:ph type="title"/>
-          </p:nvPr>
-        </p:nvSpPr>
-        <p:spPr>
-          <a:xfrm>
-            <a:off x="309038" y="114257"/>
-            <a:ext cx="1467144" cy="244055"/>
-          </a:xfrm>
-          <a:prstGeom prst="rect">
-            <a:avLst/>
-          </a:prstGeom>
-        </p:spPr>
-        <p:txBody>
-          <a:bodyPr>
-            <a:normAutofit fontScale="100000" lnSpcReduction="0"/>
-          </a:bodyPr>
-          <a:lstStyle/>
-          <a:p>
-            <a:pPr lvl="0"/>
-          </a:p>
-        </p:txBody>
-      </p:sp>
-      <p:sp>
-        <p:nvSpPr>
-          <p:cNvPr id="52" name="Shape 52"/>
-          <p:cNvSpPr/>
-          <p:nvPr>
             <p:ph type="body" idx="1"/>
           </p:nvPr>
         </p:nvSpPr>
@@ -3751,9 +3952,10 @@
           </a:bodyPr>
           <a:lstStyle/>
           <a:p>
-            <a:pPr lvl="0" marL="0" indent="0">
-              <a:buSzTx/>
-              <a:buNone/>
+            <a:pPr lvl="0">
+              <a:buBlip>
+                <a:blip r:embed="rId2"/>
+              </a:buBlip>
               <a:defRPr b="0" sz="1800">
                 <a:solidFill>
                   <a:srgbClr val="000000"/>
@@ -3766,7 +3968,7 @@
                   <a:srgbClr val="123A61"/>
                 </a:solidFill>
               </a:rPr>
-              <a:t> Ce que permet l’analyse de Tweets.</a:t>
+              <a:t>Projet « YATA »</a:t>
             </a:r>
             <a:endParaRPr b="1" sz="2600">
               <a:solidFill>
@@ -3775,15 +3977,24 @@
             </a:endParaRPr>
           </a:p>
           <a:p>
-            <a:pPr lvl="0" marL="0" indent="0">
-              <a:buSzTx/>
-              <a:buNone/>
+            <a:pPr lvl="0">
+              <a:buBlip>
+                <a:blip r:embed="rId2"/>
+              </a:buBlip>
               <a:defRPr b="0" sz="1800">
                 <a:solidFill>
                   <a:srgbClr val="000000"/>
                 </a:solidFill>
               </a:defRPr>
             </a:pPr>
+            <a:r>
+              <a:rPr b="1" sz="2600">
+                <a:solidFill>
+                  <a:srgbClr val="123A61"/>
+                </a:solidFill>
+              </a:rPr>
+              <a:t>Développement</a:t>
+            </a:r>
             <a:endParaRPr b="1" sz="2600">
               <a:solidFill>
                 <a:srgbClr val="123A61"/>
@@ -3791,9 +4002,11 @@
             </a:endParaRPr>
           </a:p>
           <a:p>
-            <a:pPr lvl="0" marL="0" indent="0">
-              <a:buSzTx/>
-              <a:buNone/>
+            <a:pPr lvl="1" marL="742950" indent="-285750">
+              <a:spcBef>
+                <a:spcPts val="400"/>
+              </a:spcBef>
+              <a:buFont typeface="Arial"/>
               <a:defRPr b="0" sz="1800">
                 <a:solidFill>
                   <a:srgbClr val="000000"/>
@@ -3801,23 +4014,107 @@
               </a:defRPr>
             </a:pPr>
             <a:r>
-              <a:rPr b="1">
+              <a:rPr sz="2000">
+                <a:latin typeface="Segoe UI Semilight"/>
+                <a:ea typeface="Segoe UI Semilight"/>
+                <a:cs typeface="Segoe UI Semilight"/>
+                <a:sym typeface="Segoe UI Semilight"/>
+              </a:rPr>
+              <a:t>FRONT</a:t>
+            </a:r>
+            <a:endParaRPr sz="2000">
+              <a:latin typeface="Segoe UI Semilight"/>
+              <a:ea typeface="Segoe UI Semilight"/>
+              <a:cs typeface="Segoe UI Semilight"/>
+              <a:sym typeface="Segoe UI Semilight"/>
+            </a:endParaRPr>
+          </a:p>
+          <a:p>
+            <a:pPr lvl="1" marL="742950" indent="-285750">
+              <a:spcBef>
+                <a:spcPts val="400"/>
+              </a:spcBef>
+              <a:buFont typeface="Arial"/>
+              <a:defRPr b="0" sz="1800">
+                <a:solidFill>
+                  <a:srgbClr val="000000"/>
+                </a:solidFill>
+              </a:defRPr>
+            </a:pPr>
+            <a:r>
+              <a:rPr sz="2000">
+                <a:latin typeface="Segoe UI Semilight"/>
+                <a:ea typeface="Segoe UI Semilight"/>
+                <a:cs typeface="Segoe UI Semilight"/>
+                <a:sym typeface="Segoe UI Semilight"/>
+              </a:rPr>
+              <a:t>BACK-END</a:t>
+            </a:r>
+            <a:endParaRPr sz="2000">
+              <a:latin typeface="Segoe UI Semilight"/>
+              <a:ea typeface="Segoe UI Semilight"/>
+              <a:cs typeface="Segoe UI Semilight"/>
+              <a:sym typeface="Segoe UI Semilight"/>
+            </a:endParaRPr>
+          </a:p>
+          <a:p>
+            <a:pPr lvl="1" marL="742950" indent="-285750">
+              <a:spcBef>
+                <a:spcPts val="400"/>
+              </a:spcBef>
+              <a:buFont typeface="Arial"/>
+              <a:defRPr b="0" sz="1800">
+                <a:solidFill>
+                  <a:srgbClr val="000000"/>
+                </a:solidFill>
+              </a:defRPr>
+            </a:pPr>
+            <a:r>
+              <a:rPr sz="2000">
+                <a:latin typeface="Segoe UI Semilight"/>
+                <a:ea typeface="Segoe UI Semilight"/>
+                <a:cs typeface="Segoe UI Semilight"/>
+                <a:sym typeface="Segoe UI Semilight"/>
+              </a:rPr>
+              <a:t>BDD</a:t>
+            </a:r>
+            <a:endParaRPr sz="2000">
+              <a:latin typeface="Segoe UI Semilight"/>
+              <a:ea typeface="Segoe UI Semilight"/>
+              <a:cs typeface="Segoe UI Semilight"/>
+              <a:sym typeface="Segoe UI Semilight"/>
+            </a:endParaRPr>
+          </a:p>
+          <a:p>
+            <a:pPr lvl="0">
+              <a:buBlip>
+                <a:blip r:embed="rId2"/>
+              </a:buBlip>
+              <a:defRPr b="0" sz="1800">
+                <a:solidFill>
+                  <a:srgbClr val="000000"/>
+                </a:solidFill>
+              </a:defRPr>
+            </a:pPr>
+            <a:r>
+              <a:rPr b="1" sz="2600">
                 <a:solidFill>
                   <a:srgbClr val="123A61"/>
                 </a:solidFill>
               </a:rPr>
-              <a:t>Créer une liste d’utilisateurs sensibles à la marque. </a:t>
-            </a:r>
-            <a:endParaRPr b="1">
+              <a:t>Bilan</a:t>
+            </a:r>
+            <a:endParaRPr b="1" sz="2600">
               <a:solidFill>
                 <a:srgbClr val="123A61"/>
               </a:solidFill>
             </a:endParaRPr>
           </a:p>
           <a:p>
-            <a:pPr lvl="0" marL="0" indent="0">
-              <a:buSzTx/>
-              <a:buNone/>
+            <a:pPr lvl="0">
+              <a:buBlip>
+                <a:blip r:embed="rId2"/>
+              </a:buBlip>
               <a:defRPr b="0" sz="1800">
                 <a:solidFill>
                   <a:srgbClr val="000000"/>
@@ -3825,107 +4122,19 @@
               </a:defRPr>
             </a:pPr>
             <a:r>
-              <a:rPr b="1" sz="1400">
+              <a:rPr b="1" sz="2600">
                 <a:solidFill>
                   <a:srgbClr val="123A61"/>
                 </a:solidFill>
               </a:rPr>
-              <a:t>Identification des plus actifs (nombre de followers, retweets, …).</a:t>
-            </a:r>
-            <a:endParaRPr b="1" sz="1400">
-              <a:solidFill>
-                <a:srgbClr val="123A61"/>
-              </a:solidFill>
-            </a:endParaRPr>
-          </a:p>
-          <a:p>
-            <a:pPr lvl="0" marL="0" indent="0">
-              <a:buSzTx/>
-              <a:buNone/>
-              <a:defRPr b="0" sz="1800">
-                <a:solidFill>
-                  <a:srgbClr val="000000"/>
-                </a:solidFill>
-              </a:defRPr>
-            </a:pPr>
-            <a:r>
-              <a:rPr b="1" sz="1400">
-                <a:solidFill>
-                  <a:srgbClr val="123A61"/>
-                </a:solidFill>
-              </a:rPr>
-              <a:t>Envoi de promotions/publicités ciblées.</a:t>
-            </a:r>
-            <a:endParaRPr b="1" sz="1400">
-              <a:solidFill>
-                <a:srgbClr val="123A61"/>
-              </a:solidFill>
-            </a:endParaRPr>
-          </a:p>
-          <a:p>
-            <a:pPr lvl="0" marL="0" indent="0">
-              <a:buSzTx/>
-              <a:buNone/>
-              <a:defRPr b="0" sz="1800">
-                <a:solidFill>
-                  <a:srgbClr val="000000"/>
-                </a:solidFill>
-              </a:defRPr>
-            </a:pPr>
-            <a:endParaRPr b="1">
-              <a:solidFill>
-                <a:srgbClr val="123A61"/>
-              </a:solidFill>
-            </a:endParaRPr>
-          </a:p>
-          <a:p>
-            <a:pPr lvl="0" marL="0" indent="0">
-              <a:buSzTx/>
-              <a:buNone/>
-              <a:defRPr b="0" sz="1800">
-                <a:solidFill>
-                  <a:srgbClr val="000000"/>
-                </a:solidFill>
-              </a:defRPr>
-            </a:pPr>
-            <a:r>
-              <a:rPr b="1">
-                <a:solidFill>
-                  <a:srgbClr val="123A61"/>
-                </a:solidFill>
-              </a:rPr>
-              <a:t>Analyse du ressenti lors d’une campagne publicitaire</a:t>
-            </a:r>
-            <a:endParaRPr b="1">
-              <a:solidFill>
-                <a:srgbClr val="123A61"/>
-              </a:solidFill>
-            </a:endParaRPr>
-          </a:p>
-          <a:p>
-            <a:pPr lvl="0" marL="0" indent="0">
-              <a:buSzTx/>
-              <a:buNone/>
-              <a:defRPr b="0" sz="1800">
-                <a:solidFill>
-                  <a:srgbClr val="000000"/>
-                </a:solidFill>
-              </a:defRPr>
-            </a:pPr>
-            <a:r>
-              <a:rPr b="1" sz="1400">
-                <a:solidFill>
-                  <a:srgbClr val="123A61"/>
-                </a:solidFill>
-              </a:rPr>
-              <a:t>Nombre de retweets, contenu positif/négatif des tweets, …</a:t>
+              <a:t>Conclusion</a:t>
             </a:r>
           </a:p>
         </p:txBody>
       </p:sp>
       <p:sp>
         <p:nvSpPr>
-          <p:cNvPr id="53" name="Shape 53"/>
+          <p:cNvPr id="52" name="Shape 52"/>
           <p:cNvSpPr/>
           <p:nvPr/>
         </p:nvSpPr>
@@ -3980,7 +4189,7 @@
                   <a:srgbClr val="FFFFFF"/>
                 </a:solidFill>
               </a:rPr>
-              <a:t>Projet « YATA »</a:t>
+              <a:t>Sommaire</a:t>
             </a:r>
           </a:p>
         </p:txBody>
@@ -4013,7 +4222,7 @@
       </p:grpSpPr>
       <p:sp>
         <p:nvSpPr>
-          <p:cNvPr id="55" name="Shape 55"/>
+          <p:cNvPr id="54" name="Shape 54"/>
           <p:cNvSpPr/>
           <p:nvPr>
             <p:ph type="title"/>
@@ -4040,7 +4249,7 @@
       </p:sp>
       <p:sp>
         <p:nvSpPr>
-          <p:cNvPr id="56" name="Shape 56"/>
+          <p:cNvPr id="55" name="Shape 55"/>
           <p:cNvSpPr/>
           <p:nvPr>
             <p:ph type="body" idx="1"/>
@@ -4061,10 +4270,9 @@
           </a:bodyPr>
           <a:lstStyle/>
           <a:p>
-            <a:pPr lvl="0">
-              <a:buBlip>
-                <a:blip r:embed="rId2"/>
-              </a:buBlip>
+            <a:pPr lvl="0" marL="0" indent="0">
+              <a:buSzTx/>
+              <a:buNone/>
               <a:defRPr b="0" sz="1800">
                 <a:solidFill>
                   <a:srgbClr val="000000"/>
@@ -4077,7 +4285,7 @@
                   <a:srgbClr val="123A61"/>
                 </a:solidFill>
               </a:rPr>
-              <a:t>Yet Another Tweets Analyzer</a:t>
+              <a:t> Ce que permet l’analyse de Tweets.</a:t>
             </a:r>
             <a:endParaRPr b="1" sz="2600">
               <a:solidFill>
@@ -4086,24 +4294,15 @@
             </a:endParaRPr>
           </a:p>
           <a:p>
-            <a:pPr lvl="0">
-              <a:buBlip>
-                <a:blip r:embed="rId2"/>
-              </a:buBlip>
+            <a:pPr lvl="0" marL="0" indent="0">
+              <a:buSzTx/>
+              <a:buNone/>
               <a:defRPr b="0" sz="1800">
                 <a:solidFill>
                   <a:srgbClr val="000000"/>
                 </a:solidFill>
               </a:defRPr>
             </a:pPr>
-            <a:r>
-              <a:rPr b="1" sz="2600">
-                <a:solidFill>
-                  <a:srgbClr val="123A61"/>
-                </a:solidFill>
-              </a:rPr>
-              <a:t>Récupération des Tweets suivant:</a:t>
-            </a:r>
             <a:endParaRPr b="1" sz="2600">
               <a:solidFill>
                 <a:srgbClr val="123A61"/>
@@ -4111,11 +4310,9 @@
             </a:endParaRPr>
           </a:p>
           <a:p>
-            <a:pPr lvl="1" marL="742950" indent="-285750">
-              <a:spcBef>
-                <a:spcPts val="400"/>
-              </a:spcBef>
-              <a:buFont typeface="Arial"/>
+            <a:pPr lvl="0" marL="0" indent="0">
+              <a:buSzTx/>
+              <a:buNone/>
               <a:defRPr b="0" sz="1800">
                 <a:solidFill>
                   <a:srgbClr val="000000"/>
@@ -4123,107 +4320,23 @@
               </a:defRPr>
             </a:pPr>
             <a:r>
-              <a:rPr sz="2000">
-                <a:latin typeface="Segoe UI Semilight"/>
-                <a:ea typeface="Segoe UI Semilight"/>
-                <a:cs typeface="Segoe UI Semilight"/>
-                <a:sym typeface="Segoe UI Semilight"/>
-              </a:rPr>
-              <a:t>Des mots clés</a:t>
-            </a:r>
-            <a:endParaRPr sz="2000">
-              <a:latin typeface="Segoe UI Semilight"/>
-              <a:ea typeface="Segoe UI Semilight"/>
-              <a:cs typeface="Segoe UI Semilight"/>
-              <a:sym typeface="Segoe UI Semilight"/>
-            </a:endParaRPr>
-          </a:p>
-          <a:p>
-            <a:pPr lvl="1" marL="742950" indent="-285750">
-              <a:spcBef>
-                <a:spcPts val="400"/>
-              </a:spcBef>
-              <a:buFont typeface="Arial"/>
-              <a:defRPr b="0" sz="1800">
-                <a:solidFill>
-                  <a:srgbClr val="000000"/>
-                </a:solidFill>
-              </a:defRPr>
-            </a:pPr>
-            <a:r>
-              <a:rPr sz="2000">
-                <a:latin typeface="Segoe UI Semilight"/>
-                <a:ea typeface="Segoe UI Semilight"/>
-                <a:cs typeface="Segoe UI Semilight"/>
-                <a:sym typeface="Segoe UI Semilight"/>
-              </a:rPr>
-              <a:t>Un pays</a:t>
-            </a:r>
-            <a:endParaRPr sz="2000">
-              <a:latin typeface="Segoe UI Semilight"/>
-              <a:ea typeface="Segoe UI Semilight"/>
-              <a:cs typeface="Segoe UI Semilight"/>
-              <a:sym typeface="Segoe UI Semilight"/>
-            </a:endParaRPr>
-          </a:p>
-          <a:p>
-            <a:pPr lvl="1" marL="742950" indent="-285750">
-              <a:spcBef>
-                <a:spcPts val="400"/>
-              </a:spcBef>
-              <a:buFont typeface="Arial"/>
-              <a:defRPr b="0" sz="1800">
-                <a:solidFill>
-                  <a:srgbClr val="000000"/>
-                </a:solidFill>
-              </a:defRPr>
-            </a:pPr>
-            <a:r>
-              <a:rPr sz="2000">
-                <a:latin typeface="Segoe UI Semilight"/>
-                <a:ea typeface="Segoe UI Semilight"/>
-                <a:cs typeface="Segoe UI Semilight"/>
-                <a:sym typeface="Segoe UI Semilight"/>
-              </a:rPr>
-              <a:t>Une langue</a:t>
-            </a:r>
-            <a:endParaRPr sz="2000">
-              <a:latin typeface="Segoe UI Semilight"/>
-              <a:ea typeface="Segoe UI Semilight"/>
-              <a:cs typeface="Segoe UI Semilight"/>
-              <a:sym typeface="Segoe UI Semilight"/>
-            </a:endParaRPr>
-          </a:p>
-          <a:p>
-            <a:pPr lvl="0">
-              <a:buBlip>
-                <a:blip r:embed="rId2"/>
-              </a:buBlip>
-              <a:defRPr b="0" sz="1800">
-                <a:solidFill>
-                  <a:srgbClr val="000000"/>
-                </a:solidFill>
-              </a:defRPr>
-            </a:pPr>
-            <a:r>
-              <a:rPr b="1" sz="2600">
+              <a:rPr b="1">
                 <a:solidFill>
                   <a:srgbClr val="123A61"/>
                 </a:solidFill>
               </a:rPr>
-              <a:t>Stockage</a:t>
-            </a:r>
-            <a:endParaRPr b="1" sz="2600">
+              <a:t>Créer une liste d’utilisateurs sensibles à la marque. </a:t>
+            </a:r>
+            <a:endParaRPr b="1">
               <a:solidFill>
                 <a:srgbClr val="123A61"/>
               </a:solidFill>
             </a:endParaRPr>
           </a:p>
           <a:p>
-            <a:pPr lvl="0">
-              <a:buBlip>
-                <a:blip r:embed="rId2"/>
-              </a:buBlip>
+            <a:pPr lvl="0" marL="0" indent="0">
+              <a:buSzTx/>
+              <a:buNone/>
               <a:defRPr b="0" sz="1800">
                 <a:solidFill>
                   <a:srgbClr val="000000"/>
@@ -4231,19 +4344,107 @@
               </a:defRPr>
             </a:pPr>
             <a:r>
-              <a:rPr b="1" sz="2600">
+              <a:rPr b="1" sz="1400">
                 <a:solidFill>
                   <a:srgbClr val="123A61"/>
                 </a:solidFill>
               </a:rPr>
-              <a:t>Traitement</a:t>
+              <a:t>Identification des plus actifs (nombre de followers, retweets, …).</a:t>
+            </a:r>
+            <a:endParaRPr b="1" sz="1400">
+              <a:solidFill>
+                <a:srgbClr val="123A61"/>
+              </a:solidFill>
+            </a:endParaRPr>
+          </a:p>
+          <a:p>
+            <a:pPr lvl="0" marL="0" indent="0">
+              <a:buSzTx/>
+              <a:buNone/>
+              <a:defRPr b="0" sz="1800">
+                <a:solidFill>
+                  <a:srgbClr val="000000"/>
+                </a:solidFill>
+              </a:defRPr>
+            </a:pPr>
+            <a:r>
+              <a:rPr b="1" sz="1400">
+                <a:solidFill>
+                  <a:srgbClr val="123A61"/>
+                </a:solidFill>
+              </a:rPr>
+              <a:t>Envoi de promotions/publicités ciblées.</a:t>
+            </a:r>
+            <a:endParaRPr b="1" sz="1400">
+              <a:solidFill>
+                <a:srgbClr val="123A61"/>
+              </a:solidFill>
+            </a:endParaRPr>
+          </a:p>
+          <a:p>
+            <a:pPr lvl="0" marL="0" indent="0">
+              <a:buSzTx/>
+              <a:buNone/>
+              <a:defRPr b="0" sz="1800">
+                <a:solidFill>
+                  <a:srgbClr val="000000"/>
+                </a:solidFill>
+              </a:defRPr>
+            </a:pPr>
+            <a:endParaRPr b="1">
+              <a:solidFill>
+                <a:srgbClr val="123A61"/>
+              </a:solidFill>
+            </a:endParaRPr>
+          </a:p>
+          <a:p>
+            <a:pPr lvl="0" marL="0" indent="0">
+              <a:buSzTx/>
+              <a:buNone/>
+              <a:defRPr b="0" sz="1800">
+                <a:solidFill>
+                  <a:srgbClr val="000000"/>
+                </a:solidFill>
+              </a:defRPr>
+            </a:pPr>
+            <a:r>
+              <a:rPr b="1">
+                <a:solidFill>
+                  <a:srgbClr val="123A61"/>
+                </a:solidFill>
+              </a:rPr>
+              <a:t>Analyse du ressenti lors d’une campagne publicitaire</a:t>
+            </a:r>
+            <a:endParaRPr b="1">
+              <a:solidFill>
+                <a:srgbClr val="123A61"/>
+              </a:solidFill>
+            </a:endParaRPr>
+          </a:p>
+          <a:p>
+            <a:pPr lvl="0" marL="0" indent="0">
+              <a:buSzTx/>
+              <a:buNone/>
+              <a:defRPr b="0" sz="1800">
+                <a:solidFill>
+                  <a:srgbClr val="000000"/>
+                </a:solidFill>
+              </a:defRPr>
+            </a:pPr>
+            <a:r>
+              <a:rPr b="1" sz="1400">
+                <a:solidFill>
+                  <a:srgbClr val="123A61"/>
+                </a:solidFill>
+              </a:rPr>
+              <a:t>Nombre de retweets, contenu positif/négatif des tweets, …</a:t>
             </a:r>
           </a:p>
         </p:txBody>
       </p:sp>
       <p:sp>
         <p:nvSpPr>
-          <p:cNvPr id="57" name="Shape 57"/>
+          <p:cNvPr id="56" name="Shape 56"/>
           <p:cNvSpPr/>
           <p:nvPr/>
         </p:nvSpPr>
@@ -4331,7 +4532,7 @@
       </p:grpSpPr>
       <p:sp>
         <p:nvSpPr>
-          <p:cNvPr id="59" name="Shape 59"/>
+          <p:cNvPr id="58" name="Shape 58"/>
           <p:cNvSpPr/>
           <p:nvPr>
             <p:ph type="title"/>
@@ -4352,27 +4553,13 @@
           </a:bodyPr>
           <a:lstStyle/>
           <a:p>
-            <a:pPr lvl="0">
-              <a:defRPr sz="1800">
-                <a:solidFill>
-                  <a:srgbClr val="000000"/>
-                </a:solidFill>
-              </a:defRPr>
-            </a:pPr>
-            <a:r>
-              <a:rPr sz="1600">
-                <a:solidFill>
-                  <a:srgbClr val="FFFFFF"/>
-                </a:solidFill>
-              </a:rPr>
-              <a:t>Développement</a:t>
-            </a:r>
+            <a:pPr lvl="0"/>
           </a:p>
         </p:txBody>
       </p:sp>
       <p:sp>
         <p:nvSpPr>
-          <p:cNvPr id="60" name="Shape 60"/>
+          <p:cNvPr id="59" name="Shape 59"/>
           <p:cNvSpPr/>
           <p:nvPr>
             <p:ph type="body" idx="1"/>
@@ -4409,7 +4596,7 @@
                   <a:srgbClr val="123A61"/>
                 </a:solidFill>
               </a:rPr>
-              <a:t>Interface  web en « Bootstrap »</a:t>
+              <a:t>Yet Another Tweets Analyzer</a:t>
             </a:r>
             <a:endParaRPr b="1" sz="2600">
               <a:solidFill>
@@ -4418,15 +4605,24 @@
             </a:endParaRPr>
           </a:p>
           <a:p>
-            <a:pPr lvl="0" marL="0" indent="0">
-              <a:buSzTx/>
-              <a:buNone/>
+            <a:pPr lvl="0">
+              <a:buBlip>
+                <a:blip r:embed="rId2"/>
+              </a:buBlip>
               <a:defRPr b="0" sz="1800">
                 <a:solidFill>
                   <a:srgbClr val="000000"/>
                 </a:solidFill>
               </a:defRPr>
             </a:pPr>
+            <a:r>
+              <a:rPr b="1" sz="2600">
+                <a:solidFill>
+                  <a:srgbClr val="123A61"/>
+                </a:solidFill>
+              </a:rPr>
+              <a:t>Récupération des Tweets suivant:</a:t>
+            </a:r>
             <a:endParaRPr b="1" sz="2600">
               <a:solidFill>
                 <a:srgbClr val="123A61"/>
@@ -4434,6 +4630,90 @@
             </a:endParaRPr>
           </a:p>
           <a:p>
+            <a:pPr lvl="1" marL="742950" indent="-285750">
+              <a:spcBef>
+                <a:spcPts val="400"/>
+              </a:spcBef>
+              <a:buFont typeface="Arial"/>
+              <a:defRPr b="0" sz="1800">
+                <a:solidFill>
+                  <a:srgbClr val="000000"/>
+                </a:solidFill>
+              </a:defRPr>
+            </a:pPr>
+            <a:r>
+              <a:rPr sz="2000">
+                <a:latin typeface="Segoe UI Semilight"/>
+                <a:ea typeface="Segoe UI Semilight"/>
+                <a:cs typeface="Segoe UI Semilight"/>
+                <a:sym typeface="Segoe UI Semilight"/>
+              </a:rPr>
+              <a:t>Des mots clés</a:t>
+            </a:r>
+            <a:endParaRPr sz="2000">
+              <a:latin typeface="Segoe UI Semilight"/>
+              <a:ea typeface="Segoe UI Semilight"/>
+              <a:cs typeface="Segoe UI Semilight"/>
+              <a:sym typeface="Segoe UI Semilight"/>
+            </a:endParaRPr>
+          </a:p>
+          <a:p>
+            <a:pPr lvl="1" marL="742950" indent="-285750">
+              <a:spcBef>
+                <a:spcPts val="400"/>
+              </a:spcBef>
+              <a:buFont typeface="Arial"/>
+              <a:defRPr b="0" sz="1800">
+                <a:solidFill>
+                  <a:srgbClr val="000000"/>
+                </a:solidFill>
+              </a:defRPr>
+            </a:pPr>
+            <a:r>
+              <a:rPr sz="2000">
+                <a:latin typeface="Segoe UI Semilight"/>
+                <a:ea typeface="Segoe UI Semilight"/>
+                <a:cs typeface="Segoe UI Semilight"/>
+                <a:sym typeface="Segoe UI Semilight"/>
+              </a:rPr>
+              <a:t>Un pays</a:t>
+            </a:r>
+            <a:endParaRPr sz="2000">
+              <a:latin typeface="Segoe UI Semilight"/>
+              <a:ea typeface="Segoe UI Semilight"/>
+              <a:cs typeface="Segoe UI Semilight"/>
+              <a:sym typeface="Segoe UI Semilight"/>
+            </a:endParaRPr>
+          </a:p>
+          <a:p>
+            <a:pPr lvl="1" marL="742950" indent="-285750">
+              <a:spcBef>
+                <a:spcPts val="400"/>
+              </a:spcBef>
+              <a:buFont typeface="Arial"/>
+              <a:defRPr b="0" sz="1800">
+                <a:solidFill>
+                  <a:srgbClr val="000000"/>
+                </a:solidFill>
+              </a:defRPr>
+            </a:pPr>
+            <a:r>
+              <a:rPr sz="2000">
+                <a:latin typeface="Segoe UI Semilight"/>
+                <a:ea typeface="Segoe UI Semilight"/>
+                <a:cs typeface="Segoe UI Semilight"/>
+                <a:sym typeface="Segoe UI Semilight"/>
+              </a:rPr>
+              <a:t>Une langue</a:t>
+            </a:r>
+            <a:endParaRPr sz="2000">
+              <a:latin typeface="Segoe UI Semilight"/>
+              <a:ea typeface="Segoe UI Semilight"/>
+              <a:cs typeface="Segoe UI Semilight"/>
+              <a:sym typeface="Segoe UI Semilight"/>
+            </a:endParaRPr>
+          </a:p>
+          <a:p>
             <a:pPr lvl="0">
               <a:buBlip>
                 <a:blip r:embed="rId2"/>
@@ -4450,7 +4730,7 @@
                   <a:srgbClr val="123A61"/>
                 </a:solidFill>
               </a:rPr>
-              <a:t>Visuel intuitif</a:t>
+              <a:t>Stockage</a:t>
             </a:r>
             <a:endParaRPr b="1" sz="2600">
               <a:solidFill>
@@ -4459,22 +4739,6 @@
             </a:endParaRPr>
           </a:p>
           <a:p>
-            <a:pPr lvl="0" marL="0" indent="0">
-              <a:buSzTx/>
-              <a:buNone/>
-              <a:defRPr b="0" sz="1800">
-                <a:solidFill>
-                  <a:srgbClr val="000000"/>
-                </a:solidFill>
-              </a:defRPr>
-            </a:pPr>
-            <a:endParaRPr b="1" sz="2600">
-              <a:solidFill>
-                <a:srgbClr val="123A61"/>
-              </a:solidFill>
-            </a:endParaRPr>
-          </a:p>
-          <a:p>
             <a:pPr lvl="0">
               <a:buBlip>
                 <a:blip r:embed="rId2"/>
@@ -4491,55 +4755,14 @@
                   <a:srgbClr val="123A61"/>
                 </a:solidFill>
               </a:rPr>
-              <a:t>Formulaire</a:t>
-            </a:r>
-            <a:endParaRPr b="1" sz="2600">
-              <a:solidFill>
-                <a:srgbClr val="123A61"/>
-              </a:solidFill>
-            </a:endParaRPr>
-          </a:p>
-          <a:p>
-            <a:pPr lvl="0" marL="0" indent="0">
-              <a:buSzTx/>
-              <a:buNone/>
-              <a:defRPr b="0" sz="1800">
-                <a:solidFill>
-                  <a:srgbClr val="000000"/>
-                </a:solidFill>
-              </a:defRPr>
-            </a:pPr>
-            <a:endParaRPr b="1" sz="2600">
-              <a:solidFill>
-                <a:srgbClr val="123A61"/>
-              </a:solidFill>
-            </a:endParaRPr>
-          </a:p>
-          <a:p>
-            <a:pPr lvl="0">
-              <a:buBlip>
-                <a:blip r:embed="rId2"/>
-              </a:buBlip>
-              <a:defRPr b="0" sz="1800">
-                <a:solidFill>
-                  <a:srgbClr val="000000"/>
-                </a:solidFill>
-              </a:defRPr>
-            </a:pPr>
-            <a:r>
-              <a:rPr b="1" sz="2600">
-                <a:solidFill>
-                  <a:srgbClr val="123A61"/>
-                </a:solidFill>
-              </a:rPr>
-              <a:t>Lancer une analyse</a:t>
+              <a:t>Traitement</a:t>
             </a:r>
           </a:p>
         </p:txBody>
       </p:sp>
       <p:sp>
         <p:nvSpPr>
-          <p:cNvPr id="61" name="Shape 61"/>
+          <p:cNvPr id="60" name="Shape 60"/>
           <p:cNvSpPr/>
           <p:nvPr/>
         </p:nvSpPr>
@@ -4594,38 +4817,11 @@
                   <a:srgbClr val="FFFFFF"/>
                 </a:solidFill>
               </a:rPr>
-              <a:t>FRONT</a:t>
+              <a:t>Projet « YATA »</a:t>
             </a:r>
           </a:p>
         </p:txBody>
       </p:sp>
-      <p:pic>
-        <p:nvPicPr>
-          <p:cNvPr id="62" name="image8.png"/>
-          <p:cNvPicPr/>
-          <p:nvPr/>
-        </p:nvPicPr>
-        <p:blipFill>
-          <a:blip r:embed="rId3">
-            <a:extLst/>
-          </a:blip>
-          <a:stretch>
-            <a:fillRect/>
-          </a:stretch>
-        </p:blipFill>
-        <p:spPr>
-          <a:xfrm>
-            <a:off x="5985335" y="2226847"/>
-            <a:ext cx="1429390" cy="1435108"/>
-          </a:xfrm>
-          <a:prstGeom prst="rect">
-            <a:avLst/>
-          </a:prstGeom>
-          <a:ln w="12700">
-            <a:miter lim="400000"/>
-          </a:ln>
-        </p:spPr>
-      </p:pic>
     </p:spTree>
   </p:cSld>
   <p:clrMapOvr>
@@ -4654,7 +4850,7 @@
       </p:grpSpPr>
       <p:sp>
         <p:nvSpPr>
-          <p:cNvPr id="64" name="Shape 64"/>
+          <p:cNvPr id="62" name="Shape 62"/>
           <p:cNvSpPr/>
           <p:nvPr>
             <p:ph type="title"/>
@@ -4662,8 +4858,8 @@
         </p:nvSpPr>
         <p:spPr>
           <a:xfrm>
-            <a:off x="317421" y="109206"/>
-            <a:ext cx="1479900" cy="225960"/>
+            <a:off x="309038" y="114257"/>
+            <a:ext cx="1467144" cy="244055"/>
           </a:xfrm>
           <a:prstGeom prst="rect">
             <a:avLst/>
@@ -4673,11 +4869,7 @@
           <a:bodyPr>
             <a:normAutofit fontScale="100000" lnSpcReduction="0"/>
           </a:bodyPr>
-          <a:lstStyle>
-            <a:lvl1pPr defTabSz="425195">
-              <a:defRPr sz="1488"/>
-            </a:lvl1pPr>
-          </a:lstStyle>
+          <a:lstStyle/>
           <a:p>
             <a:pPr lvl="0">
               <a:defRPr sz="1800">
@@ -4687,19 +4879,19 @@
               </a:defRPr>
             </a:pPr>
             <a:r>
-              <a:rPr sz="1488">
+              <a:rPr sz="1600">
                 <a:solidFill>
                   <a:srgbClr val="FFFFFF"/>
                 </a:solidFill>
               </a:rPr>
-              <a:t>Développement	</a:t>
+              <a:t>Développement</a:t>
             </a:r>
           </a:p>
         </p:txBody>
       </p:sp>
       <p:sp>
         <p:nvSpPr>
-          <p:cNvPr id="65" name="Shape 65"/>
+          <p:cNvPr id="63" name="Shape 63"/>
           <p:cNvSpPr/>
           <p:nvPr>
             <p:ph type="body" idx="1"/>
@@ -4707,26 +4899,146 @@
         </p:nvSpPr>
         <p:spPr>
           <a:xfrm>
-            <a:off x="457200" y="1151334"/>
-            <a:ext cx="4040188" cy="479823"/>
+            <a:off x="562517" y="1119615"/>
+            <a:ext cx="7887628" cy="3394472"/>
           </a:xfrm>
           <a:prstGeom prst="rect">
             <a:avLst/>
           </a:prstGeom>
         </p:spPr>
         <p:txBody>
-          <a:bodyPr>
+          <a:bodyPr lIns="0" tIns="0" rIns="0" bIns="0">
             <a:normAutofit fontScale="100000" lnSpcReduction="0"/>
           </a:bodyPr>
-          <a:lstStyle>
-            <a:lvl1pPr>
+          <a:lstStyle/>
+          <a:p>
+            <a:pPr lvl="0">
               <a:buBlip>
                 <a:blip r:embed="rId2"/>
               </a:buBlip>
-            </a:lvl1pPr>
-          </a:lstStyle>
+              <a:defRPr b="0" sz="1800">
+                <a:solidFill>
+                  <a:srgbClr val="000000"/>
+                </a:solidFill>
+              </a:defRPr>
+            </a:pPr>
+            <a:r>
+              <a:rPr b="1" sz="2600">
+                <a:solidFill>
+                  <a:srgbClr val="123A61"/>
+                </a:solidFill>
+              </a:rPr>
+              <a:t>Interface  web en « Bootstrap »</a:t>
+            </a:r>
+            <a:endParaRPr b="1" sz="2600">
+              <a:solidFill>
+                <a:srgbClr val="123A61"/>
+              </a:solidFill>
+            </a:endParaRPr>
+          </a:p>
+          <a:p>
+            <a:pPr lvl="0" marL="0" indent="0">
+              <a:buSzTx/>
+              <a:buNone/>
+              <a:defRPr b="0" sz="1800">
+                <a:solidFill>
+                  <a:srgbClr val="000000"/>
+                </a:solidFill>
+              </a:defRPr>
+            </a:pPr>
+            <a:endParaRPr b="1" sz="2600">
+              <a:solidFill>
+                <a:srgbClr val="123A61"/>
+              </a:solidFill>
+            </a:endParaRPr>
+          </a:p>
           <a:p>
             <a:pPr lvl="0">
+              <a:buBlip>
+                <a:blip r:embed="rId2"/>
+              </a:buBlip>
+              <a:defRPr b="0" sz="1800">
+                <a:solidFill>
+                  <a:srgbClr val="000000"/>
+                </a:solidFill>
+              </a:defRPr>
+            </a:pPr>
+            <a:r>
+              <a:rPr b="1" sz="2600">
+                <a:solidFill>
+                  <a:srgbClr val="123A61"/>
+                </a:solidFill>
+              </a:rPr>
+              <a:t>Visuel intuitif</a:t>
+            </a:r>
+            <a:endParaRPr b="1" sz="2600">
+              <a:solidFill>
+                <a:srgbClr val="123A61"/>
+              </a:solidFill>
+            </a:endParaRPr>
+          </a:p>
+          <a:p>
+            <a:pPr lvl="0" marL="0" indent="0">
+              <a:buSzTx/>
+              <a:buNone/>
+              <a:defRPr b="0" sz="1800">
+                <a:solidFill>
+                  <a:srgbClr val="000000"/>
+                </a:solidFill>
+              </a:defRPr>
+            </a:pPr>
+            <a:endParaRPr b="1" sz="2600">
+              <a:solidFill>
+                <a:srgbClr val="123A61"/>
+              </a:solidFill>
+            </a:endParaRPr>
+          </a:p>
+          <a:p>
+            <a:pPr lvl="0">
+              <a:buBlip>
+                <a:blip r:embed="rId2"/>
+              </a:buBlip>
+              <a:defRPr b="0" sz="1800">
+                <a:solidFill>
+                  <a:srgbClr val="000000"/>
+                </a:solidFill>
+              </a:defRPr>
+            </a:pPr>
+            <a:r>
+              <a:rPr b="1" sz="2600">
+                <a:solidFill>
+                  <a:srgbClr val="123A61"/>
+                </a:solidFill>
+              </a:rPr>
+              <a:t>Formulaire</a:t>
+            </a:r>
+            <a:endParaRPr b="1" sz="2600">
+              <a:solidFill>
+                <a:srgbClr val="123A61"/>
+              </a:solidFill>
+            </a:endParaRPr>
+          </a:p>
+          <a:p>
+            <a:pPr lvl="0" marL="0" indent="0">
+              <a:buSzTx/>
+              <a:buNone/>
+              <a:defRPr b="0" sz="1800">
+                <a:solidFill>
+                  <a:srgbClr val="000000"/>
+                </a:solidFill>
+              </a:defRPr>
+            </a:pPr>
+            <a:endParaRPr b="1" sz="2600">
+              <a:solidFill>
+                <a:srgbClr val="123A61"/>
+              </a:solidFill>
+            </a:endParaRPr>
+          </a:p>
+          <a:p>
+            <a:pPr lvl="0">
+              <a:buBlip>
+                <a:blip r:embed="rId2"/>
+              </a:buBlip>
               <a:defRPr b="0" sz="1800">
                 <a:solidFill>
                   <a:srgbClr val="000000"/>
@@ -4746,7 +5058,7 @@
       </p:sp>
       <p:sp>
         <p:nvSpPr>
-          <p:cNvPr id="66" name="Shape 66"/>
+          <p:cNvPr id="64" name="Shape 64"/>
           <p:cNvSpPr/>
           <p:nvPr/>
         </p:nvSpPr>
@@ -4808,7 +5120,7 @@
       </p:sp>
       <p:pic>
         <p:nvPicPr>
-          <p:cNvPr id="67" name="image9.png"/>
+          <p:cNvPr id="65" name="image8.png"/>
           <p:cNvPicPr/>
           <p:nvPr/>
         </p:nvPicPr>
@@ -4822,35 +5134,8 @@
         </p:blipFill>
         <p:spPr>
           <a:xfrm>
-            <a:off x="1241590" y="1631157"/>
-            <a:ext cx="6659235" cy="2971324"/>
-          </a:xfrm>
-          <a:prstGeom prst="rect">
-            <a:avLst/>
-          </a:prstGeom>
-          <a:ln w="12700">
-            <a:miter lim="400000"/>
-          </a:ln>
-        </p:spPr>
-      </p:pic>
-      <p:pic>
-        <p:nvPicPr>
-          <p:cNvPr id="68" name="image10.png"/>
-          <p:cNvPicPr/>
-          <p:nvPr/>
-        </p:nvPicPr>
-        <p:blipFill>
-          <a:blip r:embed="rId4">
-            <a:extLst/>
-          </a:blip>
-          <a:stretch>
-            <a:fillRect/>
-          </a:stretch>
-        </p:blipFill>
-        <p:spPr>
-          <a:xfrm>
-            <a:off x="1330549" y="1729739"/>
-            <a:ext cx="6481314" cy="2796541"/>
+            <a:off x="5985335" y="2226847"/>
+            <a:ext cx="1429390" cy="1435108"/>
           </a:xfrm>
           <a:prstGeom prst="rect">
             <a:avLst/>
@@ -4888,7 +5173,7 @@
       </p:grpSpPr>
       <p:sp>
         <p:nvSpPr>
-          <p:cNvPr id="70" name="Shape 70"/>
+          <p:cNvPr id="67" name="Shape 67"/>
           <p:cNvSpPr/>
           <p:nvPr>
             <p:ph type="title"/>
@@ -4926,14 +5211,248 @@
                   <a:srgbClr val="FFFFFF"/>
                 </a:solidFill>
               </a:rPr>
-              <a:t>Développement</a:t>
+              <a:t>Développement	</a:t>
             </a:r>
           </a:p>
         </p:txBody>
       </p:sp>
       <p:sp>
         <p:nvSpPr>
-          <p:cNvPr id="71" name="Shape 71"/>
+          <p:cNvPr id="68" name="Shape 68"/>
+          <p:cNvSpPr/>
+          <p:nvPr>
+            <p:ph type="body" idx="1"/>
+          </p:nvPr>
+        </p:nvSpPr>
+        <p:spPr>
+          <a:xfrm>
+            <a:off x="457200" y="1151334"/>
+            <a:ext cx="4040188" cy="479823"/>
+          </a:xfrm>
+          <a:prstGeom prst="rect">
+            <a:avLst/>
+          </a:prstGeom>
+        </p:spPr>
+        <p:txBody>
+          <a:bodyPr>
+            <a:normAutofit fontScale="100000" lnSpcReduction="0"/>
+          </a:bodyPr>
+          <a:lstStyle>
+            <a:lvl1pPr>
+              <a:buBlip>
+                <a:blip r:embed="rId2"/>
+              </a:buBlip>
+            </a:lvl1pPr>
+          </a:lstStyle>
+          <a:p>
+            <a:pPr lvl="0">
+              <a:defRPr b="0" sz="1800">
+                <a:solidFill>
+                  <a:srgbClr val="000000"/>
+                </a:solidFill>
+              </a:defRPr>
+            </a:pPr>
+            <a:r>
+              <a:rPr b="1" sz="2600">
+                <a:solidFill>
+                  <a:srgbClr val="123A61"/>
+                </a:solidFill>
+              </a:rPr>
+              <a:t>Lancer une analyse</a:t>
+            </a:r>
+          </a:p>
+        </p:txBody>
+      </p:sp>
+      <p:sp>
+        <p:nvSpPr>
+          <p:cNvPr id="69" name="Shape 69"/>
+          <p:cNvSpPr/>
+          <p:nvPr/>
+        </p:nvSpPr>
+        <p:spPr>
+          <a:xfrm>
+            <a:off x="317421" y="358311"/>
+            <a:ext cx="3557405" cy="272821"/>
+          </a:xfrm>
+          <a:prstGeom prst="rect">
+            <a:avLst/>
+          </a:prstGeom>
+          <a:ln w="12700">
+            <a:miter lim="400000"/>
+          </a:ln>
+          <a:extLst>
+            <a:ext uri="{C572A759-6A51-4108-AA02-DFA0A04FC94B}">
+              <ma14:wrappingTextBoxFlag xmlns:ma14="http://schemas.microsoft.com/office/mac/drawingml/2011/main" val="1"/>
+            </a:ext>
+          </a:extLst>
+        </p:spPr>
+        <p:txBody>
+          <a:bodyPr lIns="0" tIns="0" rIns="0" bIns="0">
+            <a:normAutofit fontScale="100000" lnSpcReduction="0"/>
+          </a:bodyPr>
+          <a:lstStyle>
+            <a:lvl1pPr>
+              <a:spcBef>
+                <a:spcPts val="300"/>
+              </a:spcBef>
+              <a:defRPr b="1" sz="1500">
+                <a:solidFill>
+                  <a:srgbClr val="FFFFFF"/>
+                </a:solidFill>
+                <a:latin typeface="Segoe UI Black"/>
+                <a:ea typeface="Segoe UI Black"/>
+                <a:cs typeface="Segoe UI Black"/>
+                <a:sym typeface="Segoe UI Black"/>
+              </a:defRPr>
+            </a:lvl1pPr>
+          </a:lstStyle>
+          <a:p>
+            <a:pPr lvl="0">
+              <a:defRPr b="0" sz="1800">
+                <a:solidFill>
+                  <a:srgbClr val="000000"/>
+                </a:solidFill>
+              </a:defRPr>
+            </a:pPr>
+            <a:r>
+              <a:rPr b="1" sz="1500">
+                <a:solidFill>
+                  <a:srgbClr val="FFFFFF"/>
+                </a:solidFill>
+              </a:rPr>
+              <a:t>FRONT</a:t>
+            </a:r>
+          </a:p>
+        </p:txBody>
+      </p:sp>
+      <p:pic>
+        <p:nvPicPr>
+          <p:cNvPr id="70" name="image9.png"/>
+          <p:cNvPicPr/>
+          <p:nvPr/>
+        </p:nvPicPr>
+        <p:blipFill>
+          <a:blip r:embed="rId3">
+            <a:extLst/>
+          </a:blip>
+          <a:stretch>
+            <a:fillRect/>
+          </a:stretch>
+        </p:blipFill>
+        <p:spPr>
+          <a:xfrm>
+            <a:off x="1241590" y="1631157"/>
+            <a:ext cx="6659235" cy="2971324"/>
+          </a:xfrm>
+          <a:prstGeom prst="rect">
+            <a:avLst/>
+          </a:prstGeom>
+          <a:ln w="12700">
+            <a:miter lim="400000"/>
+          </a:ln>
+        </p:spPr>
+      </p:pic>
+      <p:pic>
+        <p:nvPicPr>
+          <p:cNvPr id="71" name="image10.png"/>
+          <p:cNvPicPr/>
+          <p:nvPr/>
+        </p:nvPicPr>
+        <p:blipFill>
+          <a:blip r:embed="rId4">
+            <a:extLst/>
+          </a:blip>
+          <a:stretch>
+            <a:fillRect/>
+          </a:stretch>
+        </p:blipFill>
+        <p:spPr>
+          <a:xfrm>
+            <a:off x="1330549" y="1729739"/>
+            <a:ext cx="6481314" cy="2796541"/>
+          </a:xfrm>
+          <a:prstGeom prst="rect">
+            <a:avLst/>
+          </a:prstGeom>
+          <a:ln w="12700">
+            <a:miter lim="400000"/>
+          </a:ln>
+        </p:spPr>
+      </p:pic>
+    </p:spTree>
+  </p:cSld>
+  <p:clrMapOvr>
+    <a:masterClrMapping/>
+  </p:clrMapOvr>
+  <p:transition spd="med" advClick="1"/>
+</p:sld>
+</file>
+
+<file path=ppt/slides/slide8.xml><?xml version="1.0" encoding="utf-8"?>
+<p:sld xmlns:a="http://schemas.openxmlformats.org/drawingml/2006/main" xmlns:r="http://schemas.openxmlformats.org/officeDocument/2006/relationships" xmlns:p="http://schemas.openxmlformats.org/presentationml/2006/main" showMasterSp="1" showMasterPhAnim="1">
+  <p:cSld>
+    <p:spTree>
+      <p:nvGrpSpPr>
+        <p:cNvPr id="1" name=""/>
+        <p:cNvGrpSpPr/>
+        <p:nvPr/>
+      </p:nvGrpSpPr>
+      <p:grpSpPr>
+        <a:xfrm>
+          <a:off x="0" y="0"/>
+          <a:ext cx="0" cy="0"/>
+          <a:chOff x="0" y="0"/>
+          <a:chExt cx="0" cy="0"/>
+        </a:xfrm>
+      </p:grpSpPr>
+      <p:sp>
+        <p:nvSpPr>
+          <p:cNvPr id="73" name="Shape 73"/>
+          <p:cNvSpPr/>
+          <p:nvPr>
+            <p:ph type="title"/>
+          </p:nvPr>
+        </p:nvSpPr>
+        <p:spPr>
+          <a:xfrm>
+            <a:off x="317421" y="109206"/>
+            <a:ext cx="1479900" cy="225960"/>
+          </a:xfrm>
+          <a:prstGeom prst="rect">
+            <a:avLst/>
+          </a:prstGeom>
+        </p:spPr>
+        <p:txBody>
+          <a:bodyPr>
+            <a:normAutofit fontScale="100000" lnSpcReduction="0"/>
+          </a:bodyPr>
+          <a:lstStyle>
+            <a:lvl1pPr defTabSz="425195">
+              <a:defRPr sz="1488"/>
+            </a:lvl1pPr>
+          </a:lstStyle>
+          <a:p>
+            <a:pPr lvl="0">
+              <a:defRPr sz="1800">
+                <a:solidFill>
+                  <a:srgbClr val="000000"/>
+                </a:solidFill>
+              </a:defRPr>
+            </a:pPr>
+            <a:r>
+              <a:rPr sz="1488">
+                <a:solidFill>
+                  <a:srgbClr val="FFFFFF"/>
+                </a:solidFill>
+              </a:rPr>
+              <a:t>Développement</a:t>
+            </a:r>
+          </a:p>
+        </p:txBody>
+      </p:sp>
+      <p:sp>
+        <p:nvSpPr>
+          <p:cNvPr id="74" name="Shape 74"/>
           <p:cNvSpPr/>
           <p:nvPr>
             <p:ph type="body" idx="1"/>
@@ -4987,7 +5506,7 @@
       </p:sp>
       <p:sp>
         <p:nvSpPr>
-          <p:cNvPr id="72" name="Shape 72"/>
+          <p:cNvPr id="75" name="Shape 75"/>
           <p:cNvSpPr/>
           <p:nvPr/>
         </p:nvSpPr>
@@ -5053,7 +5572,7 @@
       </p:sp>
       <p:pic>
         <p:nvPicPr>
-          <p:cNvPr id="73" name="image9.png"/>
+          <p:cNvPr id="76" name="image9.png"/>
           <p:cNvPicPr/>
           <p:nvPr/>
         </p:nvPicPr>
@@ -5080,7 +5599,7 @@
       </p:pic>
       <p:pic>
         <p:nvPicPr>
-          <p:cNvPr id="74" name="image11.png"/>
+          <p:cNvPr id="77" name="image11.png"/>
           <p:cNvPicPr/>
           <p:nvPr/>
         </p:nvPicPr>
@@ -5105,6 +5624,270 @@
           </a:ln>
         </p:spPr>
       </p:pic>
+    </p:spTree>
+  </p:cSld>
+  <p:clrMapOvr>
+    <a:masterClrMapping/>
+  </p:clrMapOvr>
+  <p:transition spd="med" advClick="1"/>
+</p:sld>
+</file>
+
+<file path=ppt/slides/slide9.xml><?xml version="1.0" encoding="utf-8"?>
+<p:sld xmlns:a="http://schemas.openxmlformats.org/drawingml/2006/main" xmlns:r="http://schemas.openxmlformats.org/officeDocument/2006/relationships" xmlns:p="http://schemas.openxmlformats.org/presentationml/2006/main" showMasterSp="1" showMasterPhAnim="1">
+  <p:cSld>
+    <p:spTree>
+      <p:nvGrpSpPr>
+        <p:cNvPr id="1" name=""/>
+        <p:cNvGrpSpPr/>
+        <p:nvPr/>
+      </p:nvGrpSpPr>
+      <p:grpSpPr>
+        <a:xfrm>
+          <a:off x="0" y="0"/>
+          <a:ext cx="0" cy="0"/>
+          <a:chOff x="0" y="0"/>
+          <a:chExt cx="0" cy="0"/>
+        </a:xfrm>
+      </p:grpSpPr>
+      <p:sp>
+        <p:nvSpPr>
+          <p:cNvPr id="79" name="Shape 79"/>
+          <p:cNvSpPr/>
+          <p:nvPr>
+            <p:ph type="title"/>
+          </p:nvPr>
+        </p:nvSpPr>
+        <p:spPr>
+          <a:xfrm>
+            <a:off x="317421" y="109206"/>
+            <a:ext cx="1479900" cy="225960"/>
+          </a:xfrm>
+          <a:prstGeom prst="rect">
+            <a:avLst/>
+          </a:prstGeom>
+        </p:spPr>
+        <p:txBody>
+          <a:bodyPr>
+            <a:normAutofit fontScale="100000" lnSpcReduction="0"/>
+          </a:bodyPr>
+          <a:lstStyle>
+            <a:lvl1pPr defTabSz="425195">
+              <a:defRPr sz="1488"/>
+            </a:lvl1pPr>
+          </a:lstStyle>
+          <a:p>
+            <a:pPr lvl="0">
+              <a:defRPr sz="1800">
+                <a:solidFill>
+                  <a:srgbClr val="000000"/>
+                </a:solidFill>
+              </a:defRPr>
+            </a:pPr>
+            <a:r>
+              <a:rPr sz="1488">
+                <a:solidFill>
+                  <a:srgbClr val="FFFFFF"/>
+                </a:solidFill>
+              </a:rPr>
+              <a:t>Développement</a:t>
+            </a:r>
+          </a:p>
+        </p:txBody>
+      </p:sp>
+      <p:sp>
+        <p:nvSpPr>
+          <p:cNvPr id="80" name="Shape 80"/>
+          <p:cNvSpPr/>
+          <p:nvPr>
+            <p:ph type="body" idx="1"/>
+          </p:nvPr>
+        </p:nvSpPr>
+        <p:spPr>
+          <a:xfrm>
+            <a:off x="317421" y="358311"/>
+            <a:ext cx="3557405" cy="272821"/>
+          </a:xfrm>
+          <a:prstGeom prst="rect">
+            <a:avLst/>
+          </a:prstGeom>
+        </p:spPr>
+        <p:txBody>
+          <a:bodyPr>
+            <a:normAutofit fontScale="100000" lnSpcReduction="0"/>
+          </a:bodyPr>
+          <a:lstStyle>
+            <a:lvl1pPr marL="0" indent="0">
+              <a:spcBef>
+                <a:spcPts val="300"/>
+              </a:spcBef>
+              <a:buSzTx/>
+              <a:buNone/>
+              <a:defRPr sz="1500">
+                <a:solidFill>
+                  <a:srgbClr val="FFFFFF"/>
+                </a:solidFill>
+              </a:defRPr>
+            </a:lvl1pPr>
+          </a:lstStyle>
+          <a:p>
+            <a:pPr lvl="0">
+              <a:defRPr b="0" sz="1800">
+                <a:solidFill>
+                  <a:srgbClr val="000000"/>
+                </a:solidFill>
+              </a:defRPr>
+            </a:pPr>
+            <a:r>
+              <a:rPr b="1" sz="1500">
+                <a:solidFill>
+                  <a:srgbClr val="FFFFFF"/>
+                </a:solidFill>
+              </a:rPr>
+              <a:t>API Twitter</a:t>
+            </a:r>
+          </a:p>
+        </p:txBody>
+      </p:sp>
+      <p:pic>
+        <p:nvPicPr>
+          <p:cNvPr id="81" name="twitter_api6.png"/>
+          <p:cNvPicPr/>
+          <p:nvPr/>
+        </p:nvPicPr>
+        <p:blipFill>
+          <a:blip r:embed="rId2">
+            <a:extLst/>
+          </a:blip>
+          <a:stretch>
+            <a:fillRect/>
+          </a:stretch>
+        </p:blipFill>
+        <p:spPr>
+          <a:xfrm>
+            <a:off x="4452449" y="1126655"/>
+            <a:ext cx="4616869" cy="3115145"/>
+          </a:xfrm>
+          <a:prstGeom prst="rect">
+            <a:avLst/>
+          </a:prstGeom>
+          <a:ln w="12700">
+            <a:miter lim="400000"/>
+          </a:ln>
+        </p:spPr>
+      </p:pic>
+      <p:pic>
+        <p:nvPicPr>
+          <p:cNvPr id="82" name="Capture d’écran 2015-11-30 à 11.23.23.png"/>
+          <p:cNvPicPr/>
+          <p:nvPr/>
+        </p:nvPicPr>
+        <p:blipFill>
+          <a:blip r:embed="rId3">
+            <a:extLst/>
+          </a:blip>
+          <a:stretch>
+            <a:fillRect/>
+          </a:stretch>
+        </p:blipFill>
+        <p:spPr>
+          <a:xfrm>
+            <a:off x="79226" y="2086741"/>
+            <a:ext cx="4311119" cy="2146833"/>
+          </a:xfrm>
+          <a:prstGeom prst="rect">
+            <a:avLst/>
+          </a:prstGeom>
+          <a:ln w="12700">
+            <a:miter lim="400000"/>
+          </a:ln>
+        </p:spPr>
+      </p:pic>
+      <p:sp>
+        <p:nvSpPr>
+          <p:cNvPr id="83" name="Shape 83"/>
+          <p:cNvSpPr/>
+          <p:nvPr/>
+        </p:nvSpPr>
+        <p:spPr>
+          <a:xfrm>
+            <a:off x="227342" y="1084616"/>
+            <a:ext cx="3425761" cy="624841"/>
+          </a:xfrm>
+          <a:prstGeom prst="rect">
+            <a:avLst/>
+          </a:prstGeom>
+          <a:ln w="12700">
+            <a:miter lim="400000"/>
+          </a:ln>
+          <a:extLst>
+            <a:ext uri="{C572A759-6A51-4108-AA02-DFA0A04FC94B}">
+              <ma14:wrappingTextBoxFlag xmlns:ma14="http://schemas.microsoft.com/office/mac/drawingml/2011/main" val="1"/>
+            </a:ext>
+          </a:extLst>
+        </p:spPr>
+        <p:txBody>
+          <a:bodyPr wrap="none" lIns="0" tIns="0" rIns="0" bIns="0">
+            <a:spAutoFit/>
+          </a:bodyPr>
+          <a:lstStyle/>
+          <a:p>
+            <a:pPr lvl="0"/>
+            <a:r>
+              <a:t>Enregistrement de l’application</a:t>
+            </a:r>
+          </a:p>
+          <a:p>
+            <a:pPr lvl="0"/>
+            <a:r>
+              <a:t>auprès de Twitter.</a:t>
+            </a:r>
+          </a:p>
+        </p:txBody>
+      </p:sp>
+      <p:sp>
+        <p:nvSpPr>
+          <p:cNvPr id="84" name="Shape 84"/>
+          <p:cNvSpPr/>
+          <p:nvPr/>
+        </p:nvSpPr>
+        <p:spPr>
+          <a:xfrm>
+            <a:off x="472071" y="4444999"/>
+            <a:ext cx="7960269" cy="332741"/>
+          </a:xfrm>
+          <a:prstGeom prst="rect">
+            <a:avLst/>
+          </a:prstGeom>
+          <a:ln w="12700">
+            <a:miter lim="400000"/>
+          </a:ln>
+          <a:extLst>
+            <a:ext uri="{C572A759-6A51-4108-AA02-DFA0A04FC94B}">
+              <ma14:wrappingTextBoxFlag xmlns:ma14="http://schemas.microsoft.com/office/mac/drawingml/2011/main" val="1"/>
+            </a:ext>
+          </a:extLst>
+        </p:spPr>
+        <p:txBody>
+          <a:bodyPr lIns="45719" rIns="45719">
+            <a:spAutoFit/>
+          </a:bodyPr>
+          <a:lstStyle>
+            <a:lvl1pPr>
+              <a:defRPr sz="1600"/>
+            </a:lvl1pPr>
+          </a:lstStyle>
+          <a:p>
+            <a:pPr lvl="0">
+              <a:defRPr sz="1800"/>
+            </a:pPr>
+            <a:r>
+              <a:rPr sz="1600"/>
+              <a:t>Attribution de : Consumer key, Consumer secret, Access token, Access token secret.</a:t>
+            </a:r>
+          </a:p>
+        </p:txBody>
+      </p:sp>
     </p:spTree>
   </p:cSld>
   <p:clrMapOvr>

</xml_diff>